<commit_message>
Updated the class exercise
</commit_message>
<xml_diff>
--- a/core java/Java Fundamentals 2.pptx
+++ b/core java/Java Fundamentals 2.pptx
@@ -156,6 +156,22 @@
       </a:defRPr>
     </a:lvl9pPr>
   </p:defaultTextStyle>
+  <p:extLst>
+    <p:ext uri="{EFAFB233-063F-42B5-8137-9DF3F51BA10A}">
+      <p15:sldGuideLst xmlns:p15="http://schemas.microsoft.com/office/powerpoint/2012/main">
+        <p15:guide id="1" orient="horz" pos="2880">
+          <p15:clr>
+            <a:srgbClr val="A4A3A4"/>
+          </p15:clr>
+        </p15:guide>
+        <p15:guide id="2" pos="2160">
+          <p15:clr>
+            <a:srgbClr val="A4A3A4"/>
+          </p15:clr>
+        </p15:guide>
+      </p15:sldGuideLst>
+    </p:ext>
+  </p:extLst>
 </p:presentation>
 </file>
 
@@ -367,7 +383,7 @@
             <a:fld id="{1D8BD707-D9CF-40AE-B4C6-C98DA3205C09}" type="datetimeFigureOut">
               <a:rPr lang="en-US"/>
               <a:pPr/>
-              <a:t>6/14/2021</a:t>
+              <a:t>4/11/2022</a:t>
             </a:fld>
             <a:endParaRPr lang="en-US"/>
           </a:p>
@@ -547,7 +563,7 @@
             <a:fld id="{1D8BD707-D9CF-40AE-B4C6-C98DA3205C09}" type="datetimeFigureOut">
               <a:rPr lang="en-US"/>
               <a:pPr/>
-              <a:t>6/14/2021</a:t>
+              <a:t>4/11/2022</a:t>
             </a:fld>
             <a:endParaRPr lang="en-US"/>
           </a:p>
@@ -822,7 +838,7 @@
             <a:fld id="{1D8BD707-D9CF-40AE-B4C6-C98DA3205C09}" type="datetimeFigureOut">
               <a:rPr lang="en-US"/>
               <a:pPr/>
-              <a:t>6/14/2021</a:t>
+              <a:t>4/11/2022</a:t>
             </a:fld>
             <a:endParaRPr lang="en-US"/>
           </a:p>
@@ -1010,7 +1026,7 @@
             <a:fld id="{1D8BD707-D9CF-40AE-B4C6-C98DA3205C09}" type="datetimeFigureOut">
               <a:rPr lang="en-US"/>
               <a:pPr/>
-              <a:t>6/14/2021</a:t>
+              <a:t>4/11/2022</a:t>
             </a:fld>
             <a:endParaRPr lang="en-US"/>
           </a:p>
@@ -1132,7 +1148,7 @@
             <a:fld id="{1D8BD707-D9CF-40AE-B4C6-C98DA3205C09}" type="datetimeFigureOut">
               <a:rPr lang="en-US"/>
               <a:pPr/>
-              <a:t>6/14/2021</a:t>
+              <a:t>4/11/2022</a:t>
             </a:fld>
             <a:endParaRPr lang="en-US"/>
           </a:p>
@@ -1360,7 +1376,7 @@
             <a:fld id="{1D8BD707-D9CF-40AE-B4C6-C98DA3205C09}" type="datetimeFigureOut">
               <a:rPr lang="en-US"/>
               <a:pPr/>
-              <a:t>6/14/2021</a:t>
+              <a:t>4/11/2022</a:t>
             </a:fld>
             <a:endParaRPr lang="en-US"/>
           </a:p>
@@ -2408,11 +2424,11 @@
               <a:t> </a:t>
             </a:r>
             <a:r>
-              <a:rPr lang="en-US" sz="4200" spc="-380" dirty="0" smtClean="0"/>
+              <a:rPr lang="en-US" sz="4200" spc="-380" dirty="0"/>
               <a:t>  </a:t>
             </a:r>
             <a:r>
-              <a:rPr sz="4200" spc="-484" dirty="0" smtClean="0"/>
+              <a:rPr sz="4200" spc="-484" dirty="0"/>
               <a:t>METHOD</a:t>
             </a:r>
             <a:endParaRPr sz="4200" dirty="0"/>
@@ -4364,7 +4380,7 @@
         <p:spPr>
           <a:xfrm>
             <a:off x="1676400" y="762000"/>
-            <a:ext cx="8763000" cy="5105400"/>
+            <a:ext cx="8763000" cy="4813497"/>
           </a:xfrm>
           <a:prstGeom prst="rect">
             <a:avLst/>
@@ -4447,7 +4463,7 @@
               </a:rPr>
               <a:t>variable</a:t>
             </a:r>
-            <a:endParaRPr sz="2600">
+            <a:endParaRPr sz="2600" dirty="0">
               <a:latin typeface="Carlito"/>
               <a:cs typeface="Carlito"/>
             </a:endParaRPr>
@@ -4522,10 +4538,6 @@
               </a:rPr>
               <a:t>class</a:t>
             </a:r>
-            <a:endParaRPr sz="2400">
-              <a:latin typeface="Carlito"/>
-              <a:cs typeface="Carlito"/>
-            </a:endParaRPr>
           </a:p>
           <a:p>
             <a:pPr marL="777240" indent="-229235">
@@ -4618,7 +4630,7 @@
               </a:rPr>
               <a:t>class</a:t>
             </a:r>
-            <a:endParaRPr sz="2400">
+            <a:endParaRPr sz="2400" dirty="0">
               <a:latin typeface="Carlito"/>
               <a:cs typeface="Carlito"/>
             </a:endParaRPr>
@@ -4693,7 +4705,21 @@
               </a:rPr>
               <a:t>area</a:t>
             </a:r>
-            <a:endParaRPr sz="2400">
+            <a:r>
+              <a:rPr lang="en-IN" sz="2400" spc="-10" dirty="0">
+                <a:latin typeface="Carlito"/>
+                <a:cs typeface="Carlito"/>
+              </a:rPr>
+              <a:t> </a:t>
+            </a:r>
+            <a:r>
+              <a:rPr lang="en-IN" sz="2400" spc="-10">
+                <a:latin typeface="Carlito"/>
+                <a:cs typeface="Carlito"/>
+              </a:rPr>
+              <a:t>in memory</a:t>
+            </a:r>
+            <a:endParaRPr sz="2400" dirty="0">
               <a:latin typeface="Carlito"/>
               <a:cs typeface="Carlito"/>
             </a:endParaRPr>
@@ -4748,69 +4774,69 @@
               <a:t>creating </a:t>
             </a:r>
             <a:r>
+              <a:rPr lang="en-IN" sz="2400" spc="-5" dirty="0">
+                <a:latin typeface="Carlito"/>
+                <a:cs typeface="Carlito"/>
+              </a:rPr>
+              <a:t>an </a:t>
+            </a:r>
+            <a:r>
+              <a:rPr sz="2400" spc="-10" dirty="0">
+                <a:latin typeface="Carlito"/>
+                <a:cs typeface="Carlito"/>
+              </a:rPr>
+              <a:t>instance </a:t>
+            </a:r>
+            <a:r>
               <a:rPr sz="2400" spc="-5" dirty="0">
                 <a:latin typeface="Carlito"/>
                 <a:cs typeface="Carlito"/>
               </a:rPr>
-              <a:t>of </a:t>
-            </a:r>
-            <a:r>
-              <a:rPr sz="2400" spc="-10" dirty="0">
-                <a:latin typeface="Carlito"/>
-                <a:cs typeface="Carlito"/>
-              </a:rPr>
-              <a:t>instance </a:t>
+              <a:t>of  </a:t>
+            </a:r>
+            <a:r>
+              <a:rPr sz="2400" dirty="0">
+                <a:latin typeface="Carlito"/>
+                <a:cs typeface="Carlito"/>
+              </a:rPr>
+              <a:t>the class </a:t>
+            </a:r>
+            <a:r>
+              <a:rPr sz="2400" spc="-15" dirty="0">
+                <a:latin typeface="Carlito"/>
+                <a:cs typeface="Carlito"/>
+              </a:rPr>
+              <a:t>to </a:t>
+            </a:r>
+            <a:r>
+              <a:rPr sz="2400" dirty="0">
+                <a:latin typeface="Carlito"/>
+                <a:cs typeface="Carlito"/>
+              </a:rPr>
+              <a:t>which it </a:t>
             </a:r>
             <a:r>
               <a:rPr sz="2400" spc="-5" dirty="0">
                 <a:latin typeface="Carlito"/>
                 <a:cs typeface="Carlito"/>
               </a:rPr>
-              <a:t>of  </a:t>
-            </a:r>
-            <a:r>
-              <a:rPr sz="2400" dirty="0">
-                <a:latin typeface="Carlito"/>
-                <a:cs typeface="Carlito"/>
-              </a:rPr>
-              <a:t>the class </a:t>
+              <a:t>belongs</a:t>
+            </a:r>
+            <a:r>
+              <a:rPr sz="2400" spc="-55" dirty="0">
+                <a:latin typeface="Carlito"/>
+                <a:cs typeface="Carlito"/>
+              </a:rPr>
+              <a:t> </a:t>
             </a:r>
             <a:r>
               <a:rPr sz="2400" spc="-15" dirty="0">
                 <a:latin typeface="Carlito"/>
                 <a:cs typeface="Carlito"/>
               </a:rPr>
-              <a:t>to </a:t>
-            </a:r>
-            <a:r>
-              <a:rPr sz="2400" dirty="0">
-                <a:latin typeface="Carlito"/>
-                <a:cs typeface="Carlito"/>
-              </a:rPr>
-              <a:t>which it </a:t>
-            </a:r>
-            <a:r>
-              <a:rPr sz="2400" spc="-5" dirty="0">
-                <a:latin typeface="Carlito"/>
-                <a:cs typeface="Carlito"/>
-              </a:rPr>
-              <a:t>belongs</a:t>
-            </a:r>
-            <a:r>
-              <a:rPr sz="2400" spc="-55" dirty="0">
-                <a:latin typeface="Carlito"/>
-                <a:cs typeface="Carlito"/>
-              </a:rPr>
-              <a:t> </a:t>
-            </a:r>
-            <a:r>
-              <a:rPr sz="2400" spc="-15" dirty="0">
-                <a:latin typeface="Carlito"/>
-                <a:cs typeface="Carlito"/>
-              </a:rPr>
               <a:t>to</a:t>
             </a:r>
-            <a:endParaRPr sz="2400">
+            <a:endParaRPr sz="2400" dirty="0">
               <a:latin typeface="Carlito"/>
               <a:cs typeface="Carlito"/>
             </a:endParaRPr>
@@ -4831,7 +4857,7 @@
               </a:rPr>
               <a:t>Syntax:</a:t>
             </a:r>
-            <a:endParaRPr sz="2400">
+            <a:endParaRPr sz="2400" dirty="0">
               <a:latin typeface="Carlito"/>
               <a:cs typeface="Carlito"/>
             </a:endParaRPr>
@@ -4852,7 +4878,7 @@
               </a:rPr>
               <a:t>ClassName.staticVariable</a:t>
             </a:r>
-            <a:endParaRPr sz="2400">
+            <a:endParaRPr sz="2400" dirty="0">
               <a:latin typeface="Carlito"/>
               <a:cs typeface="Carlito"/>
             </a:endParaRPr>
@@ -12792,7 +12818,7 @@
         </p:nvGraphicFramePr>
         <p:xfrm>
           <a:off x="7156704" y="3270503"/>
-          <a:ext cx="1600200" cy="1127760"/>
+          <a:ext cx="1600200" cy="914400"/>
         </p:xfrm>
         <a:graphic>
           <a:graphicData uri="http://schemas.openxmlformats.org/drawingml/2006/table">
@@ -12801,7 +12827,13 @@
                 <a:tableStyleId>{2D5ABB26-0587-4C30-8999-92F81FD0307C}</a:tableStyleId>
               </a:tblPr>
               <a:tblGrid>
-                <a:gridCol w="1600200"/>
+                <a:gridCol w="1600200">
+                  <a:extLst>
+                    <a:ext uri="{9D8B030D-6E8A-4147-A177-3AD203B41FA5}">
+                      <a16:colId xmlns:a16="http://schemas.microsoft.com/office/drawing/2014/main" val="20000"/>
+                    </a:ext>
+                  </a:extLst>
+                </a:gridCol>
               </a:tblGrid>
               <a:tr h="304800">
                 <a:tc>
@@ -12860,6 +12892,11 @@
                     </a:solidFill>
                   </a:tcPr>
                 </a:tc>
+                <a:extLst>
+                  <a:ext uri="{0D108BD9-81ED-4DB2-BD59-A6C34878D82A}">
+                    <a16:rowId xmlns:a16="http://schemas.microsoft.com/office/drawing/2014/main" val="10000"/>
+                  </a:ext>
+                </a:extLst>
               </a:tr>
               <a:tr h="304800">
                 <a:tc>
@@ -12918,6 +12955,11 @@
                     </a:solidFill>
                   </a:tcPr>
                 </a:tc>
+                <a:extLst>
+                  <a:ext uri="{0D108BD9-81ED-4DB2-BD59-A6C34878D82A}">
+                    <a16:rowId xmlns:a16="http://schemas.microsoft.com/office/drawing/2014/main" val="10001"/>
+                  </a:ext>
+                </a:extLst>
               </a:tr>
               <a:tr h="304800">
                 <a:tc>
@@ -12976,6 +13018,11 @@
                     </a:solidFill>
                   </a:tcPr>
                 </a:tc>
+                <a:extLst>
+                  <a:ext uri="{0D108BD9-81ED-4DB2-BD59-A6C34878D82A}">
+                    <a16:rowId xmlns:a16="http://schemas.microsoft.com/office/drawing/2014/main" val="10002"/>
+                  </a:ext>
+                </a:extLst>
               </a:tr>
             </a:tbl>
           </a:graphicData>
@@ -14856,14 +14903,14 @@
               <a:t>Java	</a:t>
             </a:r>
             <a:r>
-              <a:rPr lang="en-US" sz="4300" spc="-5" dirty="0" smtClean="0">
-                <a:latin typeface="Carlito"/>
-                <a:cs typeface="Carlito"/>
-              </a:rPr>
-              <a:t> </a:t>
-            </a:r>
-            <a:r>
-              <a:rPr sz="4300" spc="-10" dirty="0" smtClean="0">
+              <a:rPr lang="en-US" sz="4300" spc="-5" dirty="0">
+                <a:latin typeface="Carlito"/>
+                <a:cs typeface="Carlito"/>
+              </a:rPr>
+              <a:t> </a:t>
+            </a:r>
+            <a:r>
+              <a:rPr sz="4300" spc="-10" dirty="0">
                 <a:latin typeface="Carlito"/>
                 <a:cs typeface="Carlito"/>
               </a:rPr>
@@ -15169,7 +15216,7 @@
         <p:spPr>
           <a:xfrm>
             <a:off x="847750" y="2903981"/>
-            <a:ext cx="9232900" cy="2037080"/>
+            <a:ext cx="9232900" cy="2382062"/>
           </a:xfrm>
           <a:prstGeom prst="rect">
             <a:avLst/>
@@ -15231,7 +15278,7 @@
               </a:rPr>
               <a:t>Polymorphism</a:t>
             </a:r>
-            <a:endParaRPr sz="2200">
+            <a:endParaRPr sz="2200" dirty="0">
               <a:latin typeface="Carlito"/>
               <a:cs typeface="Carlito"/>
             </a:endParaRPr>
@@ -15256,7 +15303,7 @@
               </a:rPr>
               <a:t> Inheritance.</a:t>
             </a:r>
-            <a:endParaRPr sz="2200">
+            <a:endParaRPr sz="2200" dirty="0">
               <a:latin typeface="Carlito"/>
               <a:cs typeface="Carlito"/>
             </a:endParaRPr>
@@ -15287,41 +15334,111 @@
               <a:t>– </a:t>
             </a:r>
             <a:r>
-              <a:rPr sz="2200" spc="-5" dirty="0">
+              <a:rPr lang="en-US" sz="2200" spc="-10" dirty="0">
+                <a:latin typeface="Carlito"/>
+                <a:cs typeface="Carlito"/>
+              </a:rPr>
+              <a:t>Hiding </a:t>
+            </a:r>
+            <a:r>
+              <a:rPr lang="en-US" sz="2200" spc="-15" dirty="0">
+                <a:latin typeface="Carlito"/>
+                <a:cs typeface="Carlito"/>
+              </a:rPr>
+              <a:t>complexity </a:t>
+            </a:r>
+            <a:r>
+              <a:rPr lang="en-US" sz="2200" spc="-5" dirty="0">
+                <a:latin typeface="Carlito"/>
+                <a:cs typeface="Carlito"/>
+              </a:rPr>
+              <a:t>of a</a:t>
+            </a:r>
+            <a:r>
+              <a:rPr lang="en-US" sz="2200" spc="114" dirty="0">
+                <a:latin typeface="Carlito"/>
+                <a:cs typeface="Carlito"/>
+              </a:rPr>
+              <a:t> </a:t>
+            </a:r>
+            <a:r>
+              <a:rPr lang="en-US" sz="2200" spc="-5" dirty="0">
+                <a:latin typeface="Carlito"/>
+                <a:cs typeface="Carlito"/>
+              </a:rPr>
+              <a:t>class</a:t>
+            </a:r>
+            <a:r>
+              <a:rPr sz="2200" spc="-10" dirty="0">
+                <a:latin typeface="Carlito"/>
+                <a:cs typeface="Carlito"/>
+              </a:rPr>
+              <a:t>.</a:t>
+            </a:r>
+            <a:endParaRPr sz="2200" dirty="0">
+              <a:latin typeface="Carlito"/>
+              <a:cs typeface="Carlito"/>
+            </a:endParaRPr>
+          </a:p>
+          <a:p>
+            <a:pPr marL="229235" indent="-217170">
+              <a:buSzPct val="95454"/>
+              <a:buFontTx/>
+              <a:buAutoNum type="arabicPeriod"/>
+              <a:tabLst>
+                <a:tab pos="229870" algn="l"/>
+              </a:tabLst>
+            </a:pPr>
+            <a:r>
+              <a:rPr sz="2200" b="1" spc="-10" dirty="0">
+                <a:latin typeface="Carlito"/>
+                <a:cs typeface="Carlito"/>
+              </a:rPr>
+              <a:t>Encapsulation:</a:t>
+            </a:r>
+            <a:r>
+              <a:rPr sz="2200" spc="-10" dirty="0">
+                <a:latin typeface="Carlito"/>
+                <a:cs typeface="Carlito"/>
+              </a:rPr>
+              <a:t>– </a:t>
+            </a:r>
+            <a:r>
+              <a:rPr lang="en-US" sz="2200" spc="-5" dirty="0">
                 <a:latin typeface="Carlito"/>
                 <a:cs typeface="Carlito"/>
               </a:rPr>
               <a:t>It is a </a:t>
             </a:r>
             <a:r>
-              <a:rPr sz="2200" spc="-10" dirty="0">
+              <a:rPr lang="en-US" sz="2200" spc="-10" dirty="0">
                 <a:latin typeface="Carlito"/>
                 <a:cs typeface="Carlito"/>
               </a:rPr>
               <a:t>thought process </a:t>
             </a:r>
             <a:r>
-              <a:rPr sz="2200" spc="-5" dirty="0">
+              <a:rPr lang="en-US" sz="2200" spc="-5" dirty="0">
                 <a:latin typeface="Carlito"/>
                 <a:cs typeface="Carlito"/>
               </a:rPr>
               <a:t>which show only the necessary</a:t>
             </a:r>
             <a:r>
-              <a:rPr sz="2200" spc="190" dirty="0">
-                <a:latin typeface="Carlito"/>
-                <a:cs typeface="Carlito"/>
-              </a:rPr>
-              <a:t> </a:t>
-            </a:r>
-            <a:r>
-              <a:rPr sz="2200" spc="-10" dirty="0">
+              <a:rPr lang="en-US" sz="2200" spc="190" dirty="0">
+                <a:latin typeface="Carlito"/>
+                <a:cs typeface="Carlito"/>
+              </a:rPr>
+              <a:t> </a:t>
+            </a:r>
+            <a:r>
+              <a:rPr lang="en-US" sz="2200" spc="-10" dirty="0">
                 <a:latin typeface="Carlito"/>
                 <a:cs typeface="Carlito"/>
               </a:rPr>
               <a:t>properties.</a:t>
             </a:r>
-            <a:endParaRPr sz="2200">
+            <a:endParaRPr sz="2200" dirty="0">
               <a:latin typeface="Carlito"/>
               <a:cs typeface="Carlito"/>
             </a:endParaRPr>
@@ -15342,44 +15459,44 @@
                 <a:latin typeface="Carlito"/>
                 <a:cs typeface="Carlito"/>
               </a:rPr>
-              <a:t>Encapsulation:</a:t>
+              <a:t>Inheritance</a:t>
             </a:r>
             <a:r>
               <a:rPr sz="2200" spc="-10" dirty="0">
                 <a:latin typeface="Carlito"/>
                 <a:cs typeface="Carlito"/>
               </a:rPr>
-              <a:t>– Hiding </a:t>
+              <a:t>:- Defining </a:t>
+            </a:r>
+            <a:r>
+              <a:rPr sz="2200" spc="-5" dirty="0">
+                <a:latin typeface="Carlito"/>
+                <a:cs typeface="Carlito"/>
+              </a:rPr>
+              <a:t>a </a:t>
             </a:r>
             <a:r>
               <a:rPr sz="2200" spc="-15" dirty="0">
                 <a:latin typeface="Carlito"/>
                 <a:cs typeface="Carlito"/>
               </a:rPr>
-              <a:t>complexity </a:t>
-            </a:r>
-            <a:r>
-              <a:rPr sz="2200" spc="-5" dirty="0">
-                <a:latin typeface="Carlito"/>
-                <a:cs typeface="Carlito"/>
-              </a:rPr>
-              <a:t>of a</a:t>
-            </a:r>
-            <a:r>
-              <a:rPr sz="2200" spc="114" dirty="0">
-                <a:latin typeface="Carlito"/>
-                <a:cs typeface="Carlito"/>
-              </a:rPr>
-              <a:t> </a:t>
-            </a:r>
-            <a:r>
-              <a:rPr sz="2200" spc="-5" dirty="0">
-                <a:latin typeface="Carlito"/>
-                <a:cs typeface="Carlito"/>
-              </a:rPr>
-              <a:t>class.</a:t>
-            </a:r>
-            <a:endParaRPr sz="2200">
+              <a:t>Parent-Child</a:t>
+            </a:r>
+            <a:r>
+              <a:rPr sz="2200" spc="60" dirty="0">
+                <a:latin typeface="Carlito"/>
+                <a:cs typeface="Carlito"/>
+              </a:rPr>
+              <a:t> </a:t>
+            </a:r>
+            <a:r>
+              <a:rPr sz="2200" spc="-10" dirty="0">
+                <a:latin typeface="Carlito"/>
+                <a:cs typeface="Carlito"/>
+              </a:rPr>
+              <a:t>Relationship.</a:t>
+            </a:r>
+            <a:endParaRPr sz="2200" dirty="0">
               <a:latin typeface="Carlito"/>
               <a:cs typeface="Carlito"/>
             </a:endParaRPr>
@@ -15400,31 +15517,45 @@
                 <a:latin typeface="Carlito"/>
                 <a:cs typeface="Carlito"/>
               </a:rPr>
-              <a:t>Inheritance</a:t>
+              <a:t>Polymorphism:</a:t>
             </a:r>
             <a:r>
               <a:rPr sz="2200" spc="-10" dirty="0">
                 <a:latin typeface="Carlito"/>
                 <a:cs typeface="Carlito"/>
               </a:rPr>
-              <a:t>:- Defining </a:t>
+              <a:t>– Object Changes </a:t>
+            </a:r>
+            <a:r>
+              <a:rPr sz="2200" spc="-20" dirty="0">
+                <a:latin typeface="Carlito"/>
+                <a:cs typeface="Carlito"/>
+              </a:rPr>
+              <a:t>it’s </a:t>
+            </a:r>
+            <a:r>
+              <a:rPr sz="2200" spc="-10" dirty="0">
+                <a:latin typeface="Carlito"/>
+                <a:cs typeface="Carlito"/>
+              </a:rPr>
+              <a:t>behaviour according </a:t>
+            </a:r>
+            <a:r>
+              <a:rPr sz="2200" spc="-20" dirty="0">
+                <a:latin typeface="Carlito"/>
+                <a:cs typeface="Carlito"/>
+              </a:rPr>
+              <a:t>to </a:t>
             </a:r>
             <a:r>
               <a:rPr sz="2200" spc="-5" dirty="0">
                 <a:latin typeface="Carlito"/>
                 <a:cs typeface="Carlito"/>
               </a:rPr>
-              <a:t>a </a:t>
-            </a:r>
-            <a:r>
-              <a:rPr sz="2200" spc="-15" dirty="0">
-                <a:latin typeface="Carlito"/>
-                <a:cs typeface="Carlito"/>
-              </a:rPr>
-              <a:t>Parent-Child</a:t>
-            </a:r>
-            <a:r>
-              <a:rPr sz="2200" spc="60" dirty="0">
+              <a:t>the</a:t>
+            </a:r>
+            <a:r>
+              <a:rPr sz="2200" spc="185" dirty="0">
                 <a:latin typeface="Carlito"/>
                 <a:cs typeface="Carlito"/>
               </a:rPr>
@@ -15435,81 +15566,9 @@
                 <a:latin typeface="Carlito"/>
                 <a:cs typeface="Carlito"/>
               </a:rPr>
-              <a:t>Relationship.</a:t>
-            </a:r>
-            <a:endParaRPr sz="2200">
-              <a:latin typeface="Carlito"/>
-              <a:cs typeface="Carlito"/>
-            </a:endParaRPr>
-          </a:p>
-          <a:p>
-            <a:pPr marL="229235" indent="-217170">
-              <a:lnSpc>
-                <a:spcPct val="100000"/>
-              </a:lnSpc>
-              <a:buSzPct val="95454"/>
-              <a:buAutoNum type="arabicPeriod"/>
-              <a:tabLst>
-                <a:tab pos="229870" algn="l"/>
-              </a:tabLst>
-            </a:pPr>
-            <a:r>
-              <a:rPr sz="2200" b="1" spc="-10" dirty="0">
-                <a:latin typeface="Carlito"/>
-                <a:cs typeface="Carlito"/>
-              </a:rPr>
-              <a:t>Polymorphism:</a:t>
-            </a:r>
-            <a:r>
-              <a:rPr sz="2200" spc="-10" dirty="0">
-                <a:latin typeface="Carlito"/>
-                <a:cs typeface="Carlito"/>
-              </a:rPr>
-              <a:t>– Object Changes </a:t>
-            </a:r>
-            <a:r>
-              <a:rPr sz="2200" spc="-20" dirty="0">
-                <a:latin typeface="Carlito"/>
-                <a:cs typeface="Carlito"/>
-              </a:rPr>
-              <a:t>it’s </a:t>
-            </a:r>
-            <a:r>
-              <a:rPr sz="2200" spc="-10" dirty="0">
-                <a:latin typeface="Carlito"/>
-                <a:cs typeface="Carlito"/>
-              </a:rPr>
-              <a:t>behaviour according </a:t>
-            </a:r>
-            <a:r>
-              <a:rPr sz="2200" spc="-20" dirty="0">
-                <a:latin typeface="Carlito"/>
-                <a:cs typeface="Carlito"/>
-              </a:rPr>
-              <a:t>to </a:t>
-            </a:r>
-            <a:r>
-              <a:rPr sz="2200" spc="-5" dirty="0">
-                <a:latin typeface="Carlito"/>
-                <a:cs typeface="Carlito"/>
-              </a:rPr>
-              <a:t>the</a:t>
-            </a:r>
-            <a:r>
-              <a:rPr sz="2200" spc="185" dirty="0">
-                <a:latin typeface="Carlito"/>
-                <a:cs typeface="Carlito"/>
-              </a:rPr>
-              <a:t> </a:t>
-            </a:r>
-            <a:r>
-              <a:rPr sz="2200" spc="-10" dirty="0">
-                <a:latin typeface="Carlito"/>
-                <a:cs typeface="Carlito"/>
-              </a:rPr>
               <a:t>situation.</a:t>
             </a:r>
-            <a:endParaRPr sz="2200">
+            <a:endParaRPr sz="2200" dirty="0">
               <a:latin typeface="Carlito"/>
               <a:cs typeface="Carlito"/>
             </a:endParaRPr>
@@ -17716,9 +17775,27 @@
                 <a:tableStyleId>{2D5ABB26-0587-4C30-8999-92F81FD0307C}</a:tableStyleId>
               </a:tblPr>
               <a:tblGrid>
-                <a:gridCol w="2241550"/>
-                <a:gridCol w="3320415"/>
-                <a:gridCol w="3580765"/>
+                <a:gridCol w="2241550">
+                  <a:extLst>
+                    <a:ext uri="{9D8B030D-6E8A-4147-A177-3AD203B41FA5}">
+                      <a16:colId xmlns:a16="http://schemas.microsoft.com/office/drawing/2014/main" val="20000"/>
+                    </a:ext>
+                  </a:extLst>
+                </a:gridCol>
+                <a:gridCol w="3320415">
+                  <a:extLst>
+                    <a:ext uri="{9D8B030D-6E8A-4147-A177-3AD203B41FA5}">
+                      <a16:colId xmlns:a16="http://schemas.microsoft.com/office/drawing/2014/main" val="20001"/>
+                    </a:ext>
+                  </a:extLst>
+                </a:gridCol>
+                <a:gridCol w="3580765">
+                  <a:extLst>
+                    <a:ext uri="{9D8B030D-6E8A-4147-A177-3AD203B41FA5}">
+                      <a16:colId xmlns:a16="http://schemas.microsoft.com/office/drawing/2014/main" val="20002"/>
+                    </a:ext>
+                  </a:extLst>
+                </a:gridCol>
               </a:tblGrid>
               <a:tr h="530351">
                 <a:tc>
@@ -17948,6 +18025,11 @@
                     </a:solidFill>
                   </a:tcPr>
                 </a:tc>
+                <a:extLst>
+                  <a:ext uri="{0D108BD9-81ED-4DB2-BD59-A6C34878D82A}">
+                    <a16:rowId xmlns:a16="http://schemas.microsoft.com/office/drawing/2014/main" val="10000"/>
+                  </a:ext>
+                </a:extLst>
               </a:tr>
               <a:tr h="1024127">
                 <a:tc>
@@ -18240,6 +18322,11 @@
                     </a:solidFill>
                   </a:tcPr>
                 </a:tc>
+                <a:extLst>
+                  <a:ext uri="{0D108BD9-81ED-4DB2-BD59-A6C34878D82A}">
+                    <a16:rowId xmlns:a16="http://schemas.microsoft.com/office/drawing/2014/main" val="10001"/>
+                  </a:ext>
+                </a:extLst>
               </a:tr>
               <a:tr h="1847088">
                 <a:tc>
@@ -18563,6 +18650,11 @@
                     </a:solidFill>
                   </a:tcPr>
                 </a:tc>
+                <a:extLst>
+                  <a:ext uri="{0D108BD9-81ED-4DB2-BD59-A6C34878D82A}">
+                    <a16:rowId xmlns:a16="http://schemas.microsoft.com/office/drawing/2014/main" val="10002"/>
+                  </a:ext>
+                </a:extLst>
               </a:tr>
               <a:tr h="1847088">
                 <a:tc>
@@ -18922,6 +19014,11 @@
                     </a:solidFill>
                   </a:tcPr>
                 </a:tc>
+                <a:extLst>
+                  <a:ext uri="{0D108BD9-81ED-4DB2-BD59-A6C34878D82A}">
+                    <a16:rowId xmlns:a16="http://schemas.microsoft.com/office/drawing/2014/main" val="10003"/>
+                  </a:ext>
+                </a:extLst>
               </a:tr>
               <a:tr h="969263">
                 <a:tc>
@@ -19144,6 +19241,11 @@
                     </a:solidFill>
                   </a:tcPr>
                 </a:tc>
+                <a:extLst>
+                  <a:ext uri="{0D108BD9-81ED-4DB2-BD59-A6C34878D82A}">
+                    <a16:rowId xmlns:a16="http://schemas.microsoft.com/office/drawing/2014/main" val="10004"/>
+                  </a:ext>
+                </a:extLst>
               </a:tr>
             </a:tbl>
           </a:graphicData>
@@ -19625,11 +19727,41 @@
                 <a:tableStyleId>{2D5ABB26-0587-4C30-8999-92F81FD0307C}</a:tableStyleId>
               </a:tblPr>
               <a:tblGrid>
-                <a:gridCol w="1820545"/>
-                <a:gridCol w="902334"/>
-                <a:gridCol w="1361439"/>
-                <a:gridCol w="1361439"/>
-                <a:gridCol w="1361440"/>
+                <a:gridCol w="1820545">
+                  <a:extLst>
+                    <a:ext uri="{9D8B030D-6E8A-4147-A177-3AD203B41FA5}">
+                      <a16:colId xmlns:a16="http://schemas.microsoft.com/office/drawing/2014/main" val="20000"/>
+                    </a:ext>
+                  </a:extLst>
+                </a:gridCol>
+                <a:gridCol w="902334">
+                  <a:extLst>
+                    <a:ext uri="{9D8B030D-6E8A-4147-A177-3AD203B41FA5}">
+                      <a16:colId xmlns:a16="http://schemas.microsoft.com/office/drawing/2014/main" val="20001"/>
+                    </a:ext>
+                  </a:extLst>
+                </a:gridCol>
+                <a:gridCol w="1361439">
+                  <a:extLst>
+                    <a:ext uri="{9D8B030D-6E8A-4147-A177-3AD203B41FA5}">
+                      <a16:colId xmlns:a16="http://schemas.microsoft.com/office/drawing/2014/main" val="20002"/>
+                    </a:ext>
+                  </a:extLst>
+                </a:gridCol>
+                <a:gridCol w="1361439">
+                  <a:extLst>
+                    <a:ext uri="{9D8B030D-6E8A-4147-A177-3AD203B41FA5}">
+                      <a16:colId xmlns:a16="http://schemas.microsoft.com/office/drawing/2014/main" val="20003"/>
+                    </a:ext>
+                  </a:extLst>
+                </a:gridCol>
+                <a:gridCol w="1361440">
+                  <a:extLst>
+                    <a:ext uri="{9D8B030D-6E8A-4147-A177-3AD203B41FA5}">
+                      <a16:colId xmlns:a16="http://schemas.microsoft.com/office/drawing/2014/main" val="20004"/>
+                    </a:ext>
+                  </a:extLst>
+                </a:gridCol>
               </a:tblGrid>
               <a:tr h="547497">
                 <a:tc gridSpan="5">
@@ -19725,6 +19857,11 @@
                   </a:txBody>
                   <a:tcPr marL="0" marR="0" marT="0" marB="0"/>
                 </a:tc>
+                <a:extLst>
+                  <a:ext uri="{0D108BD9-81ED-4DB2-BD59-A6C34878D82A}">
+                    <a16:rowId xmlns:a16="http://schemas.microsoft.com/office/drawing/2014/main" val="10000"/>
+                  </a:ext>
+                </a:extLst>
               </a:tr>
               <a:tr h="887348">
                 <a:tc>
@@ -20050,6 +20187,11 @@
                     </a:lnB>
                   </a:tcPr>
                 </a:tc>
+                <a:extLst>
+                  <a:ext uri="{0D108BD9-81ED-4DB2-BD59-A6C34878D82A}">
+                    <a16:rowId xmlns:a16="http://schemas.microsoft.com/office/drawing/2014/main" val="10001"/>
+                  </a:ext>
+                </a:extLst>
               </a:tr>
               <a:tr h="547497">
                 <a:tc>
@@ -20277,6 +20419,11 @@
                     </a:lnB>
                   </a:tcPr>
                 </a:tc>
+                <a:extLst>
+                  <a:ext uri="{0D108BD9-81ED-4DB2-BD59-A6C34878D82A}">
+                    <a16:rowId xmlns:a16="http://schemas.microsoft.com/office/drawing/2014/main" val="10002"/>
+                  </a:ext>
+                </a:extLst>
               </a:tr>
               <a:tr h="547535">
                 <a:tc>
@@ -20504,6 +20651,11 @@
                     </a:lnB>
                   </a:tcPr>
                 </a:tc>
+                <a:extLst>
+                  <a:ext uri="{0D108BD9-81ED-4DB2-BD59-A6C34878D82A}">
+                    <a16:rowId xmlns:a16="http://schemas.microsoft.com/office/drawing/2014/main" val="10003"/>
+                  </a:ext>
+                </a:extLst>
               </a:tr>
               <a:tr h="547535">
                 <a:tc>
@@ -20738,6 +20890,11 @@
                     </a:lnB>
                   </a:tcPr>
                 </a:tc>
+                <a:extLst>
+                  <a:ext uri="{0D108BD9-81ED-4DB2-BD59-A6C34878D82A}">
+                    <a16:rowId xmlns:a16="http://schemas.microsoft.com/office/drawing/2014/main" val="10004"/>
+                  </a:ext>
+                </a:extLst>
               </a:tr>
               <a:tr h="547528">
                 <a:tc>
@@ -20965,6 +21122,11 @@
                     </a:lnB>
                   </a:tcPr>
                 </a:tc>
+                <a:extLst>
+                  <a:ext uri="{0D108BD9-81ED-4DB2-BD59-A6C34878D82A}">
+                    <a16:rowId xmlns:a16="http://schemas.microsoft.com/office/drawing/2014/main" val="10005"/>
+                  </a:ext>
+                </a:extLst>
               </a:tr>
             </a:tbl>
           </a:graphicData>
@@ -22355,9 +22517,27 @@
                 <a:tableStyleId>{2D5ABB26-0587-4C30-8999-92F81FD0307C}</a:tableStyleId>
               </a:tblPr>
               <a:tblGrid>
-                <a:gridCol w="1896110"/>
-                <a:gridCol w="4530090"/>
-                <a:gridCol w="5015865"/>
+                <a:gridCol w="1896110">
+                  <a:extLst>
+                    <a:ext uri="{9D8B030D-6E8A-4147-A177-3AD203B41FA5}">
+                      <a16:colId xmlns:a16="http://schemas.microsoft.com/office/drawing/2014/main" val="20000"/>
+                    </a:ext>
+                  </a:extLst>
+                </a:gridCol>
+                <a:gridCol w="4530090">
+                  <a:extLst>
+                    <a:ext uri="{9D8B030D-6E8A-4147-A177-3AD203B41FA5}">
+                      <a16:colId xmlns:a16="http://schemas.microsoft.com/office/drawing/2014/main" val="20001"/>
+                    </a:ext>
+                  </a:extLst>
+                </a:gridCol>
+                <a:gridCol w="5015865">
+                  <a:extLst>
+                    <a:ext uri="{9D8B030D-6E8A-4147-A177-3AD203B41FA5}">
+                      <a16:colId xmlns:a16="http://schemas.microsoft.com/office/drawing/2014/main" val="20002"/>
+                    </a:ext>
+                  </a:extLst>
+                </a:gridCol>
               </a:tblGrid>
               <a:tr h="621664">
                 <a:tc>
@@ -22528,6 +22708,11 @@
                     </a:solidFill>
                   </a:tcPr>
                 </a:tc>
+                <a:extLst>
+                  <a:ext uri="{0D108BD9-81ED-4DB2-BD59-A6C34878D82A}">
+                    <a16:rowId xmlns:a16="http://schemas.microsoft.com/office/drawing/2014/main" val="10000"/>
+                  </a:ext>
+                </a:extLst>
               </a:tr>
               <a:tr h="1420876">
                 <a:tc>
@@ -22835,6 +23020,11 @@
                     </a:solidFill>
                   </a:tcPr>
                 </a:tc>
+                <a:extLst>
+                  <a:ext uri="{0D108BD9-81ED-4DB2-BD59-A6C34878D82A}">
+                    <a16:rowId xmlns:a16="http://schemas.microsoft.com/office/drawing/2014/main" val="10001"/>
+                  </a:ext>
+                </a:extLst>
               </a:tr>
               <a:tr h="1154430">
                 <a:tc>
@@ -23145,6 +23335,11 @@
                     </a:solidFill>
                   </a:tcPr>
                 </a:tc>
+                <a:extLst>
+                  <a:ext uri="{0D108BD9-81ED-4DB2-BD59-A6C34878D82A}">
+                    <a16:rowId xmlns:a16="http://schemas.microsoft.com/office/drawing/2014/main" val="10002"/>
+                  </a:ext>
+                </a:extLst>
               </a:tr>
               <a:tr h="1154404">
                 <a:tc>
@@ -23463,6 +23658,11 @@
                     </a:solidFill>
                   </a:tcPr>
                 </a:tc>
+                <a:extLst>
+                  <a:ext uri="{0D108BD9-81ED-4DB2-BD59-A6C34878D82A}">
+                    <a16:rowId xmlns:a16="http://schemas.microsoft.com/office/drawing/2014/main" val="10003"/>
+                  </a:ext>
+                </a:extLst>
               </a:tr>
             </a:tbl>
           </a:graphicData>
@@ -30072,11 +30272,11 @@
               <a:t> </a:t>
             </a:r>
             <a:r>
-              <a:rPr lang="en-US" sz="4200" spc="-370" dirty="0" smtClean="0"/>
-              <a:t> </a:t>
-            </a:r>
-            <a:r>
-              <a:rPr sz="4200" spc="-570" dirty="0" smtClean="0"/>
+              <a:rPr lang="en-US" sz="4200" spc="-370" dirty="0"/>
+              <a:t> </a:t>
+            </a:r>
+            <a:r>
+              <a:rPr sz="4200" spc="-570" dirty="0"/>
               <a:t>OVERLOADING</a:t>
             </a:r>
             <a:endParaRPr sz="4200" dirty="0"/>
@@ -30729,23 +30929,23 @@
               <a:t>CONSTRUCTOR </a:t>
             </a:r>
             <a:r>
-              <a:rPr lang="en-US" sz="4400" spc="-715" dirty="0" smtClean="0"/>
+              <a:rPr lang="en-US" sz="4400" spc="-715" dirty="0"/>
               <a:t>  </a:t>
             </a:r>
             <a:r>
-              <a:rPr sz="4400" spc="-600" dirty="0" smtClean="0"/>
+              <a:rPr sz="4400" spc="-600" dirty="0"/>
               <a:t>OVERLOADING</a:t>
             </a:r>
             <a:r>
-              <a:rPr sz="4400" spc="-455" dirty="0" smtClean="0"/>
-              <a:t> </a:t>
-            </a:r>
-            <a:r>
-              <a:rPr lang="en-US" sz="4400" spc="-455" dirty="0" smtClean="0"/>
-              <a:t> </a:t>
-            </a:r>
-            <a:r>
-              <a:rPr sz="4400" spc="-355" dirty="0" smtClean="0"/>
+              <a:rPr sz="4400" spc="-455" dirty="0"/>
+              <a:t> </a:t>
+            </a:r>
+            <a:r>
+              <a:rPr lang="en-US" sz="4400" spc="-455" dirty="0"/>
+              <a:t> </a:t>
+            </a:r>
+            <a:r>
+              <a:rPr sz="4400" spc="-355" dirty="0"/>
               <a:t>Example</a:t>
             </a:r>
             <a:endParaRPr sz="4400" dirty="0"/>

</xml_diff>